<commit_message>
Creating/Updating slides for video recordings
</commit_message>
<xml_diff>
--- a/VideoSessionsMaterials/v1-introducing-the-course.pptx
+++ b/VideoSessionsMaterials/v1-introducing-the-course.pptx
@@ -5281,11 +5281,7 @@
             <a:pPr eaLnBrk="1" hangingPunct="1"/>
             <a:r>
               <a:rPr lang="en-US" dirty="0" smtClean="0"/>
-              <a:t>What: The </a:t>
-            </a:r>
-            <a:r>
-              <a:rPr lang="en-US" dirty="0" smtClean="0"/>
-              <a:t>Smart Player API</a:t>
+              <a:t>What: The Smart Player API</a:t>
             </a:r>
           </a:p>
         </p:txBody>
@@ -5313,73 +5309,73 @@
           <a:p>
             <a:pPr eaLnBrk="1" hangingPunct="1"/>
             <a:r>
-              <a:rPr lang="en-US" sz="3000" dirty="0" smtClean="0"/>
+              <a:rPr lang="en-US" sz="3200" dirty="0" smtClean="0"/>
               <a:t>Used to customize</a:t>
             </a:r>
             <a:r>
-              <a:rPr lang="en-US" sz="3000" dirty="0"/>
+              <a:rPr lang="en-US" sz="3200" dirty="0"/>
               <a:t>, integrate </a:t>
             </a:r>
             <a:r>
-              <a:rPr lang="en-US" sz="3000" dirty="0" smtClean="0"/>
+              <a:rPr lang="en-US" sz="3200" dirty="0" smtClean="0"/>
               <a:t>with, </a:t>
             </a:r>
             <a:r>
-              <a:rPr lang="en-US" sz="3000" dirty="0"/>
+              <a:rPr lang="en-US" sz="3200" dirty="0"/>
               <a:t>or add functionality </a:t>
             </a:r>
             <a:r>
-              <a:rPr lang="en-US" sz="3000" dirty="0" smtClean="0"/>
+              <a:rPr lang="en-US" sz="3200" dirty="0" smtClean="0"/>
               <a:t>to, </a:t>
             </a:r>
             <a:r>
-              <a:rPr lang="en-US" sz="3000" dirty="0"/>
+              <a:rPr lang="en-US" sz="3200" dirty="0"/>
               <a:t>your players through external </a:t>
             </a:r>
             <a:r>
-              <a:rPr lang="en-US" sz="3000" dirty="0" smtClean="0"/>
+              <a:rPr lang="en-US" sz="3200" dirty="0" smtClean="0"/>
               <a:t>scripts </a:t>
             </a:r>
           </a:p>
           <a:p>
             <a:pPr eaLnBrk="1" hangingPunct="1"/>
             <a:r>
-              <a:rPr lang="en-US" sz="3000" dirty="0" smtClean="0"/>
+              <a:rPr lang="en-US" sz="3200" dirty="0" smtClean="0"/>
               <a:t>The </a:t>
             </a:r>
             <a:r>
-              <a:rPr lang="en-US" sz="3000" dirty="0"/>
+              <a:rPr lang="en-US" sz="3200" dirty="0"/>
               <a:t>API:</a:t>
             </a:r>
           </a:p>
           <a:p>
             <a:pPr lvl="1" eaLnBrk="1" hangingPunct="1"/>
             <a:r>
-              <a:rPr lang="en-US" sz="3000" dirty="0"/>
+              <a:rPr lang="en-US" sz="3200" dirty="0"/>
               <a:t>Exposes objects and events in the player</a:t>
             </a:r>
           </a:p>
           <a:p>
             <a:pPr lvl="1" eaLnBrk="1" hangingPunct="1"/>
             <a:r>
-              <a:rPr lang="en-US" sz="3000" dirty="0"/>
+              <a:rPr lang="en-US" sz="3200" dirty="0"/>
               <a:t>Offers methods to control or alter functionality</a:t>
             </a:r>
           </a:p>
           <a:p>
             <a:pPr lvl="1" eaLnBrk="1" hangingPunct="1"/>
             <a:r>
-              <a:rPr lang="en-US" sz="3000" dirty="0"/>
+              <a:rPr lang="en-US" sz="3200" dirty="0"/>
               <a:t>Allows for reporting or acting on player </a:t>
             </a:r>
             <a:r>
-              <a:rPr lang="en-US" sz="3000" dirty="0" smtClean="0"/>
+              <a:rPr lang="en-US" sz="3200" dirty="0" smtClean="0"/>
               <a:t>events</a:t>
             </a:r>
           </a:p>
           <a:p>
             <a:r>
-              <a:rPr lang="en-US" sz="3000" dirty="0" smtClean="0"/>
+              <a:rPr lang="en-US" sz="3200" dirty="0" smtClean="0"/>
               <a:t>Works with all Brightcove Players, both the Flash and HTML5 versions</a:t>
             </a:r>
           </a:p>
@@ -5482,30 +5478,30 @@
           <a:lstStyle/>
           <a:p>
             <a:r>
-              <a:rPr lang="en-US" sz="3000" dirty="0"/>
+              <a:rPr lang="en-US" sz="3200" dirty="0"/>
               <a:t>http://</a:t>
             </a:r>
             <a:r>
-              <a:rPr lang="en-US" sz="3000" dirty="0" err="1"/>
+              <a:rPr lang="en-US" sz="3200" dirty="0" err="1"/>
               <a:t>docs.brightcove.com</a:t>
             </a:r>
             <a:r>
-              <a:rPr lang="en-US" sz="3000" dirty="0"/>
+              <a:rPr lang="en-US" sz="3200" dirty="0"/>
               <a:t>/en/video-cloud/smart-player-</a:t>
             </a:r>
             <a:r>
-              <a:rPr lang="en-US" sz="3000" dirty="0" err="1"/>
+              <a:rPr lang="en-US" sz="3200" dirty="0" err="1"/>
               <a:t>api</a:t>
             </a:r>
             <a:r>
-              <a:rPr lang="en-US" sz="3000" dirty="0"/>
+              <a:rPr lang="en-US" sz="3200" dirty="0"/>
               <a:t>/</a:t>
             </a:r>
             <a:r>
-              <a:rPr lang="en-US" sz="3000" dirty="0" err="1"/>
+              <a:rPr lang="en-US" sz="3200" dirty="0" err="1"/>
               <a:t>index.html</a:t>
             </a:r>
-            <a:endParaRPr lang="en-US" sz="3000" dirty="0"/>
+            <a:endParaRPr lang="en-US" sz="3200" dirty="0"/>
           </a:p>
         </p:txBody>
       </p:sp>
@@ -5641,58 +5637,58 @@
           <a:lstStyle/>
           <a:p>
             <a:r>
-              <a:rPr lang="en-US" sz="3000" dirty="0" smtClean="0"/>
+              <a:rPr lang="en-US" sz="3200" dirty="0" smtClean="0"/>
               <a:t>Introducing the Course</a:t>
             </a:r>
           </a:p>
           <a:p>
             <a:r>
-              <a:rPr lang="en-US" sz="3000" dirty="0" smtClean="0"/>
+              <a:rPr lang="en-US" sz="3200" dirty="0" smtClean="0"/>
               <a:t>Setting Up</a:t>
             </a:r>
           </a:p>
           <a:p>
             <a:r>
-              <a:rPr lang="en-US" sz="3000" dirty="0" smtClean="0"/>
+              <a:rPr lang="en-US" sz="3200" dirty="0" smtClean="0"/>
               <a:t>Understanding the Smart Player API</a:t>
             </a:r>
           </a:p>
           <a:p>
             <a:r>
-              <a:rPr lang="en-US" sz="3000" dirty="0" smtClean="0"/>
+              <a:rPr lang="en-US" sz="3200" dirty="0" smtClean="0"/>
               <a:t>Using JavaScript with the Smart Player API</a:t>
             </a:r>
           </a:p>
           <a:p>
             <a:r>
-              <a:rPr lang="en-US" sz="3000" dirty="0" smtClean="0"/>
+              <a:rPr lang="en-US" sz="3200" dirty="0" smtClean="0"/>
               <a:t>Getting Started with the Smart Player API &amp; Demo (code exploration)</a:t>
             </a:r>
           </a:p>
           <a:p>
             <a:r>
-              <a:rPr lang="en-US" sz="3000" dirty="0" smtClean="0"/>
+              <a:rPr lang="en-US" sz="3200" dirty="0" smtClean="0"/>
               <a:t>Access Video Data &amp; Demo</a:t>
             </a:r>
           </a:p>
           <a:p>
             <a:r>
-              <a:rPr lang="en-US" sz="3000" dirty="0" smtClean="0"/>
+              <a:rPr lang="en-US" sz="3200" dirty="0" smtClean="0"/>
               <a:t>Adding and Removing Event Listeners &amp; Demo</a:t>
             </a:r>
           </a:p>
           <a:p>
             <a:r>
-              <a:rPr lang="en-US" sz="3000" dirty="0" smtClean="0"/>
+              <a:rPr lang="en-US" sz="3200" dirty="0" smtClean="0"/>
               <a:t>Accessing the Video Player Module and Video Data &amp; Demo</a:t>
             </a:r>
           </a:p>
           <a:p>
             <a:r>
-              <a:rPr lang="en-US" sz="3000" dirty="0" smtClean="0"/>
+              <a:rPr lang="en-US" sz="3200" dirty="0" smtClean="0"/>
               <a:t>Fetching and Displaying Playlists &amp; Demo</a:t>
             </a:r>
-            <a:endParaRPr lang="en-US" sz="3000" dirty="0"/>
+            <a:endParaRPr lang="en-US" sz="3200" dirty="0"/>
           </a:p>
         </p:txBody>
       </p:sp>
@@ -5830,11 +5826,7 @@
             <a:pPr eaLnBrk="1" hangingPunct="1"/>
             <a:r>
               <a:rPr lang="en-US" dirty="0" smtClean="0"/>
-              <a:t>Smart Player API </a:t>
-            </a:r>
-            <a:r>
-              <a:rPr lang="en-US" dirty="0" smtClean="0"/>
-              <a:t>Training &amp; Pre-</a:t>
+              <a:t>Smart Player API Training &amp; Pre-</a:t>
             </a:r>
             <a:r>
               <a:rPr lang="en-US" dirty="0" err="1" smtClean="0"/>
@@ -5865,35 +5857,31 @@
           <a:p>
             <a:pPr eaLnBrk="1" hangingPunct="1"/>
             <a:r>
-              <a:rPr lang="en-US" sz="3000" dirty="0" smtClean="0"/>
+              <a:rPr lang="en-US" sz="3200" dirty="0" smtClean="0"/>
               <a:t>This course provides </a:t>
             </a:r>
             <a:r>
-              <a:rPr lang="en-US" sz="3000" dirty="0"/>
+              <a:rPr lang="en-US" sz="3200" dirty="0"/>
               <a:t>a</a:t>
             </a:r>
             <a:r>
-              <a:rPr lang="en-US" sz="3000" dirty="0" smtClean="0"/>
+              <a:rPr lang="en-US" sz="3200" dirty="0" smtClean="0"/>
               <a:t> overview </a:t>
             </a:r>
             <a:r>
-              <a:rPr lang="en-US" sz="3000" dirty="0"/>
+              <a:rPr lang="en-US" sz="3200" dirty="0"/>
               <a:t>of interacting with a Brightcove Player programmatically to create a customized online video experience </a:t>
             </a:r>
           </a:p>
           <a:p>
             <a:pPr eaLnBrk="1" hangingPunct="1"/>
             <a:r>
-              <a:rPr lang="en-US" sz="3000" dirty="0"/>
+              <a:rPr lang="en-US" sz="3200" dirty="0"/>
               <a:t>Designed for developers with </a:t>
             </a:r>
             <a:r>
-              <a:rPr lang="en-US" sz="3000" dirty="0" smtClean="0"/>
-              <a:t>basic HTML and JavaScript </a:t>
-            </a:r>
-            <a:r>
-              <a:rPr lang="en-US" sz="3000" dirty="0" smtClean="0"/>
-              <a:t>experience</a:t>
+              <a:rPr lang="en-US" sz="3200" dirty="0" smtClean="0"/>
+              <a:t>basic HTML and JavaScript experience</a:t>
             </a:r>
           </a:p>
         </p:txBody>

</xml_diff>